<commit_message>
Renamed scene graph to node hierarchy
</commit_message>
<xml_diff>
--- a/specification/figures/pptx/assetLayout.pptx
+++ b/specification/figures/pptx/assetLayout.pptx
@@ -302,7 +302,7 @@
               <a:pPr>
                 <a:defRPr/>
               </a:pPr>
-              <a:t>3/19/2013</a:t>
+              <a:t>3/20/2013</a:t>
             </a:fld>
             <a:endParaRPr lang="en-US"/>
           </a:p>
@@ -518,7 +518,7 @@
               <a:pPr>
                 <a:defRPr/>
               </a:pPr>
-              <a:t>3/19/2013</a:t>
+              <a:t>3/20/2013</a:t>
             </a:fld>
             <a:endParaRPr lang="en-US"/>
           </a:p>
@@ -2138,7 +2138,15 @@
                   <a:schemeClr val="tx1"/>
                 </a:solidFill>
               </a:rPr>
-              <a:t>Scene graph, materials, </a:t>
+              <a:t>Node </a:t>
+            </a:r>
+            <a:r>
+              <a:rPr lang="en-US" sz="1200" dirty="0">
+                <a:solidFill>
+                  <a:schemeClr val="tx1"/>
+                </a:solidFill>
+              </a:rPr>
+              <a:t>hierarchy, </a:t>
             </a:r>
             <a:r>
               <a:rPr lang="en-US" sz="1200" dirty="0" smtClean="0">
@@ -2146,7 +2154,7 @@
                   <a:schemeClr val="tx1"/>
                 </a:solidFill>
               </a:rPr>
-              <a:t>and cameras</a:t>
+              <a:t>materials, and cameras</a:t>
             </a:r>
             <a:endParaRPr lang="en-US" sz="1200" dirty="0">
               <a:solidFill>
@@ -2245,15 +2253,7 @@
                   <a:schemeClr val="tx1"/>
                 </a:solidFill>
               </a:rPr>
-              <a:t>.</a:t>
-            </a:r>
-            <a:r>
-              <a:rPr lang="en-US" b="1" dirty="0" smtClean="0">
-                <a:solidFill>
-                  <a:schemeClr val="tx1"/>
-                </a:solidFill>
-              </a:rPr>
-              <a:t>jpg, </a:t>
+              <a:t>.jpg, </a:t>
             </a:r>
             <a:r>
               <a:rPr lang="en-US" b="1" dirty="0">
@@ -2271,11 +2271,6 @@
               </a:rPr>
               <a:t>…</a:t>
             </a:r>
-            <a:endParaRPr lang="en-US" b="1" dirty="0" smtClean="0">
-              <a:solidFill>
-                <a:schemeClr val="tx1"/>
-              </a:solidFill>
-            </a:endParaRPr>
           </a:p>
           <a:p>
             <a:pPr algn="ctr"/>
@@ -2331,11 +2326,6 @@
               </a:rPr>
               <a:t>.glsl</a:t>
             </a:r>
-            <a:endParaRPr lang="en-US" b="1" dirty="0" smtClean="0">
-              <a:solidFill>
-                <a:schemeClr val="tx1"/>
-              </a:solidFill>
-            </a:endParaRPr>
           </a:p>
           <a:p>
             <a:pPr algn="ctr"/>

</xml_diff>